<commit_message>
add part for pentagon
</commit_message>
<xml_diff>
--- a/Documents/Documents of project/prezentatsia.pptx
+++ b/Documents/Documents of project/prezentatsia.pptx
@@ -134,7 +134,7 @@
   </p:defaultTextStyle>
   <p:extLst>
     <p:ext uri="{EFAFB233-063F-42B5-8137-9DF3F51BA10A}">
-      <p15:sldGuideLst xmlns="" xmlns:p15="http://schemas.microsoft.com/office/powerpoint/2012/main">
+      <p15:sldGuideLst xmlns:p15="http://schemas.microsoft.com/office/powerpoint/2012/main">
         <p15:guide id="1" orient="horz" pos="2160">
           <p15:clr>
             <a:srgbClr val="A4A3A4"/>
@@ -344,7 +344,7 @@
             <a:fld id="{2F5C65C5-0C56-4187-BCB8-E4D3764250E3}" type="datetimeFigureOut">
               <a:rPr lang="ru-RU" smtClean="0"/>
               <a:pPr/>
-              <a:t>05.05.2016</a:t>
+              <a:t>16.05.2016</a:t>
             </a:fld>
             <a:endParaRPr lang="ru-RU"/>
           </a:p>
@@ -511,7 +511,7 @@
             <a:fld id="{2F5C65C5-0C56-4187-BCB8-E4D3764250E3}" type="datetimeFigureOut">
               <a:rPr lang="ru-RU" smtClean="0"/>
               <a:pPr/>
-              <a:t>05.05.2016</a:t>
+              <a:t>16.05.2016</a:t>
             </a:fld>
             <a:endParaRPr lang="ru-RU"/>
           </a:p>
@@ -688,7 +688,7 @@
             <a:fld id="{2F5C65C5-0C56-4187-BCB8-E4D3764250E3}" type="datetimeFigureOut">
               <a:rPr lang="ru-RU" smtClean="0"/>
               <a:pPr/>
-              <a:t>05.05.2016</a:t>
+              <a:t>16.05.2016</a:t>
             </a:fld>
             <a:endParaRPr lang="ru-RU"/>
           </a:p>
@@ -873,7 +873,7 @@
             <a:fld id="{2F5C65C5-0C56-4187-BCB8-E4D3764250E3}" type="datetimeFigureOut">
               <a:rPr lang="ru-RU" smtClean="0"/>
               <a:pPr/>
-              <a:t>05.05.2016</a:t>
+              <a:t>16.05.2016</a:t>
             </a:fld>
             <a:endParaRPr lang="ru-RU"/>
           </a:p>
@@ -1137,7 +1137,7 @@
             <a:fld id="{2F5C65C5-0C56-4187-BCB8-E4D3764250E3}" type="datetimeFigureOut">
               <a:rPr lang="ru-RU" smtClean="0"/>
               <a:pPr/>
-              <a:t>05.05.2016</a:t>
+              <a:t>16.05.2016</a:t>
             </a:fld>
             <a:endParaRPr lang="ru-RU"/>
           </a:p>
@@ -1487,7 +1487,7 @@
             <a:fld id="{2F5C65C5-0C56-4187-BCB8-E4D3764250E3}" type="datetimeFigureOut">
               <a:rPr lang="ru-RU" smtClean="0"/>
               <a:pPr/>
-              <a:t>05.05.2016</a:t>
+              <a:t>16.05.2016</a:t>
             </a:fld>
             <a:endParaRPr lang="ru-RU"/>
           </a:p>
@@ -1797,7 +1797,7 @@
             <a:fld id="{2F5C65C5-0C56-4187-BCB8-E4D3764250E3}" type="datetimeFigureOut">
               <a:rPr lang="ru-RU" smtClean="0"/>
               <a:pPr/>
-              <a:t>05.05.2016</a:t>
+              <a:t>16.05.2016</a:t>
             </a:fld>
             <a:endParaRPr lang="ru-RU"/>
           </a:p>
@@ -2026,7 +2026,7 @@
             <a:fld id="{2F5C65C5-0C56-4187-BCB8-E4D3764250E3}" type="datetimeFigureOut">
               <a:rPr lang="ru-RU" smtClean="0"/>
               <a:pPr/>
-              <a:t>05.05.2016</a:t>
+              <a:t>16.05.2016</a:t>
             </a:fld>
             <a:endParaRPr lang="ru-RU"/>
           </a:p>
@@ -2118,7 +2118,7 @@
             <a:fld id="{2F5C65C5-0C56-4187-BCB8-E4D3764250E3}" type="datetimeFigureOut">
               <a:rPr lang="ru-RU" smtClean="0"/>
               <a:pPr/>
-              <a:t>05.05.2016</a:t>
+              <a:t>16.05.2016</a:t>
             </a:fld>
             <a:endParaRPr lang="ru-RU"/>
           </a:p>
@@ -2408,7 +2408,7 @@
             <a:fld id="{2F5C65C5-0C56-4187-BCB8-E4D3764250E3}" type="datetimeFigureOut">
               <a:rPr lang="ru-RU" smtClean="0"/>
               <a:pPr/>
-              <a:t>05.05.2016</a:t>
+              <a:t>16.05.2016</a:t>
             </a:fld>
             <a:endParaRPr lang="ru-RU"/>
           </a:p>
@@ -2679,7 +2679,7 @@
             <a:fld id="{2F5C65C5-0C56-4187-BCB8-E4D3764250E3}" type="datetimeFigureOut">
               <a:rPr lang="ru-RU" smtClean="0"/>
               <a:pPr/>
-              <a:t>05.05.2016</a:t>
+              <a:t>16.05.2016</a:t>
             </a:fld>
             <a:endParaRPr lang="ru-RU"/>
           </a:p>
@@ -2891,7 +2891,7 @@
             <a:fld id="{2F5C65C5-0C56-4187-BCB8-E4D3764250E3}" type="datetimeFigureOut">
               <a:rPr lang="ru-RU" smtClean="0"/>
               <a:pPr/>
-              <a:t>05.05.2016</a:t>
+              <a:t>16.05.2016</a:t>
             </a:fld>
             <a:endParaRPr lang="ru-RU"/>
           </a:p>
@@ -3487,6 +3487,13 @@
   <p:clrMapOvr>
     <a:masterClrMapping/>
   </p:clrMapOvr>
+  <p:timing>
+    <p:tnLst>
+      <p:par>
+        <p:cTn id="1" dur="indefinite" restart="never" nodeType="tmRoot"/>
+      </p:par>
+    </p:tnLst>
+  </p:timing>
 </p:sld>
 </file>
 
@@ -3611,6 +3618,13 @@
   <p:clrMapOvr>
     <a:masterClrMapping/>
   </p:clrMapOvr>
+  <p:timing>
+    <p:tnLst>
+      <p:par>
+        <p:cTn id="1" dur="indefinite" restart="never" nodeType="tmRoot"/>
+      </p:par>
+    </p:tnLst>
+  </p:timing>
 </p:sld>
 </file>
 
@@ -3740,6 +3754,13 @@
   <p:clrMapOvr>
     <a:masterClrMapping/>
   </p:clrMapOvr>
+  <p:timing>
+    <p:tnLst>
+      <p:par>
+        <p:cTn id="1" dur="indefinite" restart="never" nodeType="tmRoot"/>
+      </p:par>
+    </p:tnLst>
+  </p:timing>
 </p:sld>
 </file>
 
@@ -3856,6 +3877,13 @@
   <p:clrMapOvr>
     <a:masterClrMapping/>
   </p:clrMapOvr>
+  <p:timing>
+    <p:tnLst>
+      <p:par>
+        <p:cTn id="1" dur="indefinite" restart="never" nodeType="tmRoot"/>
+      </p:par>
+    </p:tnLst>
+  </p:timing>
 </p:sld>
 </file>
 
@@ -3976,6 +4004,13 @@
   <p:clrMapOvr>
     <a:masterClrMapping/>
   </p:clrMapOvr>
+  <p:timing>
+    <p:tnLst>
+      <p:par>
+        <p:cTn id="1" dur="indefinite" restart="never" nodeType="tmRoot"/>
+      </p:par>
+    </p:tnLst>
+  </p:timing>
 </p:sld>
 </file>
 
@@ -4214,6 +4249,13 @@
   <p:clrMapOvr>
     <a:masterClrMapping/>
   </p:clrMapOvr>
+  <p:timing>
+    <p:tnLst>
+      <p:par>
+        <p:cTn id="1" dur="indefinite" restart="never" nodeType="tmRoot"/>
+      </p:par>
+    </p:tnLst>
+  </p:timing>
 </p:sld>
 </file>
 
@@ -4361,6 +4403,13 @@
   <p:clrMapOvr>
     <a:masterClrMapping/>
   </p:clrMapOvr>
+  <p:timing>
+    <p:tnLst>
+      <p:par>
+        <p:cTn id="1" dur="indefinite" restart="never" nodeType="tmRoot"/>
+      </p:par>
+    </p:tnLst>
+  </p:timing>
 </p:sld>
 </file>
 
@@ -4789,6 +4838,13 @@
   <p:clrMapOvr>
     <a:masterClrMapping/>
   </p:clrMapOvr>
+  <p:timing>
+    <p:tnLst>
+      <p:par>
+        <p:cTn id="1" dur="indefinite" restart="never" nodeType="tmRoot"/>
+      </p:par>
+    </p:tnLst>
+  </p:timing>
 </p:sld>
 </file>
 
@@ -4880,6 +4936,13 @@
   <p:clrMapOvr>
     <a:masterClrMapping/>
   </p:clrMapOvr>
+  <p:timing>
+    <p:tnLst>
+      <p:par>
+        <p:cTn id="1" dur="indefinite" restart="never" nodeType="tmRoot"/>
+      </p:par>
+    </p:tnLst>
+  </p:timing>
 </p:sld>
 </file>
 
@@ -4990,6 +5053,13 @@
   <p:clrMapOvr>
     <a:masterClrMapping/>
   </p:clrMapOvr>
+  <p:timing>
+    <p:tnLst>
+      <p:par>
+        <p:cTn id="1" dur="indefinite" restart="never" nodeType="tmRoot"/>
+      </p:par>
+    </p:tnLst>
+  </p:timing>
 </p:sld>
 </file>
 
@@ -5044,8 +5114,8 @@
           </a:p>
         </p:txBody>
       </p:sp>
-      <mc:AlternateContent xmlns:mc="http://schemas.openxmlformats.org/markup-compatibility/2006">
-        <mc:Choice xmlns:a14="http://schemas.microsoft.com/office/drawing/2010/main" Requires="a14">
+      <mc:AlternateContent xmlns:mc="http://schemas.openxmlformats.org/markup-compatibility/2006" xmlns:a14="http://schemas.microsoft.com/office/drawing/2010/main">
+        <mc:Choice Requires="a14">
           <p:sp>
             <p:nvSpPr>
               <p:cNvPr id="3" name="Объект 2"/>
@@ -5139,7 +5209,7 @@
                         <m:sSubPr>
                           <m:ctrlPr>
                             <a:rPr lang="ru-RU" sz="2800" i="1">
-                              <a:latin typeface="Cambria Math"/>
+                              <a:latin typeface="Cambria Math" panose="02040503050406030204" pitchFamily="18" charset="0"/>
                             </a:rPr>
                           </m:ctrlPr>
                         </m:sSubPr>
@@ -5170,7 +5240,7 @@
                         <m:fPr>
                           <m:ctrlPr>
                             <a:rPr lang="ru-RU" sz="2800" i="1">
-                              <a:latin typeface="Cambria Math"/>
+                              <a:latin typeface="Cambria Math" panose="02040503050406030204" pitchFamily="18" charset="0"/>
                             </a:rPr>
                           </m:ctrlPr>
                         </m:fPr>
@@ -5236,7 +5306,7 @@
                         <m:sSubPr>
                           <m:ctrlPr>
                             <a:rPr lang="ru-RU" sz="2800" i="1">
-                              <a:latin typeface="Cambria Math"/>
+                              <a:latin typeface="Cambria Math" panose="02040503050406030204" pitchFamily="18" charset="0"/>
                             </a:rPr>
                           </m:ctrlPr>
                         </m:sSubPr>
@@ -5267,7 +5337,7 @@
                         <m:fPr>
                           <m:ctrlPr>
                             <a:rPr lang="ru-RU" sz="2800" i="1">
-                              <a:latin typeface="Cambria Math"/>
+                              <a:latin typeface="Cambria Math" panose="02040503050406030204" pitchFamily="18" charset="0"/>
                             </a:rPr>
                           </m:ctrlPr>
                         </m:fPr>
@@ -5330,7 +5400,7 @@
                       <m:sSubPr>
                         <m:ctrlPr>
                           <a:rPr lang="ru-RU" sz="2800" i="1">
-                            <a:latin typeface="Cambria Math"/>
+                            <a:latin typeface="Cambria Math" panose="02040503050406030204" pitchFamily="18" charset="0"/>
                           </a:rPr>
                         </m:ctrlPr>
                       </m:sSubPr>
@@ -5361,7 +5431,7 @@
                       <m:fPr>
                         <m:ctrlPr>
                           <a:rPr lang="ru-RU" sz="2800" i="1">
-                            <a:latin typeface="Cambria Math"/>
+                            <a:latin typeface="Cambria Math" panose="02040503050406030204" pitchFamily="18" charset="0"/>
                           </a:rPr>
                         </m:ctrlPr>
                       </m:fPr>
@@ -5424,7 +5494,7 @@
                       <m:sSubPr>
                         <m:ctrlPr>
                           <a:rPr lang="ru-RU" sz="2800" i="1">
-                            <a:latin typeface="Cambria Math"/>
+                            <a:latin typeface="Cambria Math" panose="02040503050406030204" pitchFamily="18" charset="0"/>
                           </a:rPr>
                         </m:ctrlPr>
                       </m:sSubPr>
@@ -5455,7 +5525,7 @@
                       <m:fPr>
                         <m:ctrlPr>
                           <a:rPr lang="ru-RU" sz="2800" i="1">
-                            <a:latin typeface="Cambria Math"/>
+                            <a:latin typeface="Cambria Math" panose="02040503050406030204" pitchFamily="18" charset="0"/>
                           </a:rPr>
                         </m:ctrlPr>
                       </m:fPr>
@@ -5464,7 +5534,7 @@
                           <m:sSubPr>
                             <m:ctrlPr>
                               <a:rPr lang="ru-RU" sz="2800" i="1">
-                                <a:latin typeface="Cambria Math"/>
+                                <a:latin typeface="Cambria Math" panose="02040503050406030204" pitchFamily="18" charset="0"/>
                               </a:rPr>
                             </m:ctrlPr>
                           </m:sSubPr>
@@ -5495,7 +5565,7 @@
                           <m:sSubPr>
                             <m:ctrlPr>
                               <a:rPr lang="ru-RU" sz="2800" i="1">
-                                <a:latin typeface="Cambria Math"/>
+                                <a:latin typeface="Cambria Math" panose="02040503050406030204" pitchFamily="18" charset="0"/>
                               </a:rPr>
                             </m:ctrlPr>
                           </m:sSubPr>
@@ -5526,7 +5596,7 @@
                           <m:sSubPr>
                             <m:ctrlPr>
                               <a:rPr lang="ru-RU" sz="2800" i="1">
-                                <a:latin typeface="Cambria Math"/>
+                                <a:latin typeface="Cambria Math" panose="02040503050406030204" pitchFamily="18" charset="0"/>
                               </a:rPr>
                             </m:ctrlPr>
                           </m:sSubPr>
@@ -5594,7 +5664,7 @@
             </p:txBody>
           </p:sp>
         </mc:Choice>
-        <mc:Fallback>
+        <mc:Fallback xmlns="">
           <p:sp>
             <p:nvSpPr>
               <p:cNvPr id="3" name="Объект 2"/>
@@ -5692,6 +5762,13 @@
   <p:clrMapOvr>
     <a:masterClrMapping/>
   </p:clrMapOvr>
+  <p:timing>
+    <p:tnLst>
+      <p:par>
+        <p:cTn id="1" dur="indefinite" restart="never" nodeType="tmRoot"/>
+      </p:par>
+    </p:tnLst>
+  </p:timing>
 </p:sld>
 </file>
 
@@ -5926,6 +6003,13 @@
   <p:clrMapOvr>
     <a:masterClrMapping/>
   </p:clrMapOvr>
+  <p:timing>
+    <p:tnLst>
+      <p:par>
+        <p:cTn id="1" dur="indefinite" restart="never" nodeType="tmRoot"/>
+      </p:par>
+    </p:tnLst>
+  </p:timing>
 </p:sld>
 </file>
 
@@ -6115,6 +6199,13 @@
   <p:clrMapOvr>
     <a:masterClrMapping/>
   </p:clrMapOvr>
+  <p:timing>
+    <p:tnLst>
+      <p:par>
+        <p:cTn id="1" dur="indefinite" restart="never" nodeType="tmRoot"/>
+      </p:par>
+    </p:tnLst>
+  </p:timing>
 </p:sld>
 </file>
 
@@ -6249,6 +6340,13 @@
   <p:clrMapOvr>
     <a:masterClrMapping/>
   </p:clrMapOvr>
+  <p:timing>
+    <p:tnLst>
+      <p:par>
+        <p:cTn id="1" dur="indefinite" restart="never" nodeType="tmRoot"/>
+      </p:par>
+    </p:tnLst>
+  </p:timing>
 </p:sld>
 </file>
 
@@ -6345,14 +6443,7 @@
                 <a:latin typeface="Times New Roman" pitchFamily="18" charset="0"/>
                 <a:cs typeface="Times New Roman" pitchFamily="18" charset="0"/>
               </a:rPr>
-              <a:t>декомпозируем пятиугольник на  5 </a:t>
-            </a:r>
-            <a:r>
-              <a:rPr lang="ru-RU" dirty="0" smtClean="0">
-                <a:latin typeface="Times New Roman" pitchFamily="18" charset="0"/>
-                <a:cs typeface="Times New Roman" pitchFamily="18" charset="0"/>
-              </a:rPr>
-              <a:t>треугольников.</a:t>
+              <a:t>декомпозируем пятиугольник на  5 треугольников.</a:t>
             </a:r>
           </a:p>
           <a:p>
@@ -6435,7 +6526,7 @@
         </p:blipFill>
         <p:spPr>
           <a:xfrm>
-            <a:off x="3923928" y="3429000"/>
+            <a:off x="2051720" y="3429000"/>
             <a:ext cx="4320480" cy="2933659"/>
           </a:xfrm>
           <a:prstGeom prst="rect">
@@ -6459,6 +6550,13 @@
   <p:clrMapOvr>
     <a:masterClrMapping/>
   </p:clrMapOvr>
+  <p:timing>
+    <p:tnLst>
+      <p:par>
+        <p:cTn id="1" dur="indefinite" restart="never" nodeType="tmRoot"/>
+      </p:par>
+    </p:tnLst>
+  </p:timing>
 </p:sld>
 </file>
 
@@ -6592,7 +6690,7 @@
       </p:sp>
       <p:pic>
         <p:nvPicPr>
-          <p:cNvPr id="4" name="Рисунок 3"/>
+          <p:cNvPr id="5" name="Рисунок 4"/>
           <p:cNvPicPr>
             <a:picLocks noChangeAspect="1"/>
           </p:cNvPicPr>
@@ -6612,8 +6710,38 @@
         </p:blipFill>
         <p:spPr>
           <a:xfrm>
-            <a:off x="5004048" y="3670190"/>
-            <a:ext cx="3024336" cy="2438306"/>
+            <a:off x="251520" y="3645024"/>
+            <a:ext cx="4680520" cy="3096344"/>
+          </a:xfrm>
+          <a:prstGeom prst="rect">
+            <a:avLst/>
+          </a:prstGeom>
+        </p:spPr>
+      </p:pic>
+      <p:pic>
+        <p:nvPicPr>
+          <p:cNvPr id="7" name="Рисунок 6"/>
+          <p:cNvPicPr>
+            <a:picLocks noChangeAspect="1"/>
+          </p:cNvPicPr>
+          <p:nvPr/>
+        </p:nvPicPr>
+        <p:blipFill>
+          <a:blip r:embed="rId3">
+            <a:extLst>
+              <a:ext uri="{28A0092B-C50C-407E-A947-70E740481C1C}">
+                <a14:useLocalDpi xmlns:a14="http://schemas.microsoft.com/office/drawing/2010/main" val="0"/>
+              </a:ext>
+            </a:extLst>
+          </a:blip>
+          <a:stretch>
+            <a:fillRect/>
+          </a:stretch>
+        </p:blipFill>
+        <p:spPr>
+          <a:xfrm rot="10800000">
+            <a:off x="3851920" y="3645022"/>
+            <a:ext cx="4799788" cy="3068957"/>
           </a:xfrm>
           <a:prstGeom prst="rect">
             <a:avLst/>
@@ -6630,6 +6758,13 @@
   <p:clrMapOvr>
     <a:masterClrMapping/>
   </p:clrMapOvr>
+  <p:timing>
+    <p:tnLst>
+      <p:par>
+        <p:cTn id="1" dur="indefinite" restart="never" nodeType="tmRoot"/>
+      </p:par>
+    </p:tnLst>
+  </p:timing>
 </p:sld>
 </file>
 
@@ -6862,6 +6997,13 @@
   <p:clrMapOvr>
     <a:masterClrMapping/>
   </p:clrMapOvr>
+  <p:timing>
+    <p:tnLst>
+      <p:par>
+        <p:cTn id="1" dur="indefinite" restart="never" nodeType="tmRoot"/>
+      </p:par>
+    </p:tnLst>
+  </p:timing>
 </p:sld>
 </file>
 
@@ -7012,6 +7154,13 @@
   <p:clrMapOvr>
     <a:masterClrMapping/>
   </p:clrMapOvr>
+  <p:timing>
+    <p:tnLst>
+      <p:par>
+        <p:cTn id="1" dur="indefinite" restart="never" nodeType="tmRoot"/>
+      </p:par>
+    </p:tnLst>
+  </p:timing>
 </p:sld>
 </file>
 
@@ -7614,6 +7763,13 @@
   <p:clrMapOvr>
     <a:masterClrMapping/>
   </p:clrMapOvr>
+  <p:timing>
+    <p:tnLst>
+      <p:par>
+        <p:cTn id="1" dur="indefinite" restart="never" nodeType="tmRoot"/>
+      </p:par>
+    </p:tnLst>
+  </p:timing>
 </p:sld>
 </file>
 
@@ -7727,6 +7883,13 @@
   <p:clrMapOvr>
     <a:masterClrMapping/>
   </p:clrMapOvr>
+  <p:timing>
+    <p:tnLst>
+      <p:par>
+        <p:cTn id="1" dur="indefinite" restart="never" nodeType="tmRoot"/>
+      </p:par>
+    </p:tnLst>
+  </p:timing>
 </p:sld>
 </file>
 
@@ -7840,6 +8003,13 @@
   <p:clrMapOvr>
     <a:masterClrMapping/>
   </p:clrMapOvr>
+  <p:timing>
+    <p:tnLst>
+      <p:par>
+        <p:cTn id="1" dur="indefinite" restart="never" nodeType="tmRoot"/>
+      </p:par>
+    </p:tnLst>
+  </p:timing>
 </p:sld>
 </file>
 
@@ -7954,7 +8124,7 @@
                       <m:sSubPr>
                         <m:ctrlPr>
                           <a:rPr lang="ru-RU" i="1" smtClean="0">
-                            <a:latin typeface="Cambria Math"/>
+                            <a:latin typeface="Cambria Math" panose="02040503050406030204" pitchFamily="18" charset="0"/>
                             <a:cs typeface="Times New Roman" pitchFamily="18" charset="0"/>
                           </a:rPr>
                         </m:ctrlPr>
@@ -7989,7 +8159,7 @@
                       <m:sSubPr>
                         <m:ctrlPr>
                           <a:rPr lang="ru-RU" i="1">
-                            <a:latin typeface="Cambria Math"/>
+                            <a:latin typeface="Cambria Math" panose="02040503050406030204" pitchFamily="18" charset="0"/>
                             <a:cs typeface="Times New Roman" pitchFamily="18" charset="0"/>
                           </a:rPr>
                         </m:ctrlPr>
@@ -8024,7 +8194,7 @@
                       <m:sSubPr>
                         <m:ctrlPr>
                           <a:rPr lang="ru-RU" b="0" i="1" smtClean="0">
-                            <a:latin typeface="Cambria Math"/>
+                            <a:latin typeface="Cambria Math" panose="02040503050406030204" pitchFamily="18" charset="0"/>
                             <a:cs typeface="Times New Roman" pitchFamily="18" charset="0"/>
                           </a:rPr>
                         </m:ctrlPr>
@@ -8059,7 +8229,7 @@
                       <m:sSubPr>
                         <m:ctrlPr>
                           <a:rPr lang="ru-RU" i="1">
-                            <a:latin typeface="Cambria Math"/>
+                            <a:latin typeface="Cambria Math" panose="02040503050406030204" pitchFamily="18" charset="0"/>
                             <a:cs typeface="Times New Roman" pitchFamily="18" charset="0"/>
                           </a:rPr>
                         </m:ctrlPr>
@@ -8094,7 +8264,7 @@
                       <m:sSubPr>
                         <m:ctrlPr>
                           <a:rPr lang="ru-RU" i="1">
-                            <a:latin typeface="Cambria Math"/>
+                            <a:latin typeface="Cambria Math" panose="02040503050406030204" pitchFamily="18" charset="0"/>
                             <a:cs typeface="Times New Roman" pitchFamily="18" charset="0"/>
                           </a:rPr>
                         </m:ctrlPr>
@@ -8129,7 +8299,7 @@
                       <m:sSubPr>
                         <m:ctrlPr>
                           <a:rPr lang="ru-RU" i="1">
-                            <a:latin typeface="Cambria Math"/>
+                            <a:latin typeface="Cambria Math" panose="02040503050406030204" pitchFamily="18" charset="0"/>
                             <a:cs typeface="Times New Roman" pitchFamily="18" charset="0"/>
                           </a:rPr>
                         </m:ctrlPr>
@@ -8192,7 +8362,7 @@
                       <m:sSubPr>
                         <m:ctrlPr>
                           <a:rPr lang="ru-RU" i="1">
-                            <a:latin typeface="Cambria Math"/>
+                            <a:latin typeface="Cambria Math" panose="02040503050406030204" pitchFamily="18" charset="0"/>
                             <a:cs typeface="Times New Roman" pitchFamily="18" charset="0"/>
                           </a:rPr>
                         </m:ctrlPr>
@@ -8304,7 +8474,7 @@
                       <m:sSubPr>
                         <m:ctrlPr>
                           <a:rPr lang="ru-RU" i="1" smtClean="0">
-                            <a:latin typeface="Cambria Math"/>
+                            <a:latin typeface="Cambria Math" panose="02040503050406030204" pitchFamily="18" charset="0"/>
                             <a:cs typeface="Times New Roman" pitchFamily="18" charset="0"/>
                           </a:rPr>
                         </m:ctrlPr>
@@ -8339,7 +8509,7 @@
                       <m:sSubPr>
                         <m:ctrlPr>
                           <a:rPr lang="ru-RU" i="1">
-                            <a:latin typeface="Cambria Math"/>
+                            <a:latin typeface="Cambria Math" panose="02040503050406030204" pitchFamily="18" charset="0"/>
                             <a:cs typeface="Times New Roman" pitchFamily="18" charset="0"/>
                           </a:rPr>
                         </m:ctrlPr>
@@ -8524,6 +8694,13 @@
   <p:clrMapOvr>
     <a:masterClrMapping/>
   </p:clrMapOvr>
+  <p:timing>
+    <p:tnLst>
+      <p:par>
+        <p:cTn id="1" dur="indefinite" restart="never" nodeType="tmRoot"/>
+      </p:par>
+    </p:tnLst>
+  </p:timing>
 </p:sld>
 </file>
 
@@ -8742,6 +8919,13 @@
   <p:clrMapOvr>
     <a:masterClrMapping/>
   </p:clrMapOvr>
+  <p:timing>
+    <p:tnLst>
+      <p:par>
+        <p:cTn id="1" dur="indefinite" restart="never" nodeType="tmRoot"/>
+      </p:par>
+    </p:tnLst>
+  </p:timing>
 </p:sld>
 </file>
 
@@ -8851,7 +9035,7 @@
                       <m:sSubPr>
                         <m:ctrlPr>
                           <a:rPr lang="ru-RU" i="1" smtClean="0">
-                            <a:latin typeface="Cambria Math"/>
+                            <a:latin typeface="Cambria Math" panose="02040503050406030204" pitchFamily="18" charset="0"/>
                             <a:cs typeface="Times New Roman" pitchFamily="18" charset="0"/>
                           </a:rPr>
                         </m:ctrlPr>
@@ -8902,7 +9086,7 @@
                       <m:sSubPr>
                         <m:ctrlPr>
                           <a:rPr lang="ru-RU" i="1">
-                            <a:latin typeface="Cambria Math"/>
+                            <a:latin typeface="Cambria Math" panose="02040503050406030204" pitchFamily="18" charset="0"/>
                             <a:cs typeface="Times New Roman" pitchFamily="18" charset="0"/>
                           </a:rPr>
                         </m:ctrlPr>
@@ -8962,7 +9146,7 @@
                       <m:fPr>
                         <m:ctrlPr>
                           <a:rPr lang="ru-RU" i="1">
-                            <a:latin typeface="Cambria Math"/>
+                            <a:latin typeface="Cambria Math" panose="02040503050406030204" pitchFamily="18" charset="0"/>
                             <a:cs typeface="Times New Roman" pitchFamily="18" charset="0"/>
                           </a:rPr>
                         </m:ctrlPr>
@@ -8972,7 +9156,7 @@
                           <m:sSubPr>
                             <m:ctrlPr>
                               <a:rPr lang="ru-RU" i="1">
-                                <a:latin typeface="Cambria Math"/>
+                                <a:latin typeface="Cambria Math" panose="02040503050406030204" pitchFamily="18" charset="0"/>
                                 <a:cs typeface="Times New Roman" pitchFamily="18" charset="0"/>
                               </a:rPr>
                             </m:ctrlPr>
@@ -9002,7 +9186,7 @@
                           <m:sSubPr>
                             <m:ctrlPr>
                               <a:rPr lang="ru-RU" i="1">
-                                <a:latin typeface="Cambria Math"/>
+                                <a:latin typeface="Cambria Math" panose="02040503050406030204" pitchFamily="18" charset="0"/>
                                 <a:cs typeface="Times New Roman" pitchFamily="18" charset="0"/>
                               </a:rPr>
                             </m:ctrlPr>
@@ -9076,7 +9260,7 @@
                       <m:sSubPr>
                         <m:ctrlPr>
                           <a:rPr lang="ru-RU" i="1">
-                            <a:latin typeface="Cambria Math"/>
+                            <a:latin typeface="Cambria Math" panose="02040503050406030204" pitchFamily="18" charset="0"/>
                             <a:cs typeface="Times New Roman" pitchFamily="18" charset="0"/>
                           </a:rPr>
                         </m:ctrlPr>
@@ -9131,7 +9315,7 @@
                       <m:sSubPr>
                         <m:ctrlPr>
                           <a:rPr lang="ru-RU" i="1">
-                            <a:latin typeface="Cambria Math"/>
+                            <a:latin typeface="Cambria Math" panose="02040503050406030204" pitchFamily="18" charset="0"/>
                             <a:cs typeface="Times New Roman" pitchFamily="18" charset="0"/>
                           </a:rPr>
                         </m:ctrlPr>
@@ -9191,7 +9375,7 @@
                       <m:fPr>
                         <m:ctrlPr>
                           <a:rPr lang="ru-RU" i="1">
-                            <a:latin typeface="Cambria Math"/>
+                            <a:latin typeface="Cambria Math" panose="02040503050406030204" pitchFamily="18" charset="0"/>
                             <a:cs typeface="Times New Roman" pitchFamily="18" charset="0"/>
                           </a:rPr>
                         </m:ctrlPr>
@@ -9201,7 +9385,7 @@
                           <m:sSubPr>
                             <m:ctrlPr>
                               <a:rPr lang="ru-RU" i="1">
-                                <a:latin typeface="Cambria Math"/>
+                                <a:latin typeface="Cambria Math" panose="02040503050406030204" pitchFamily="18" charset="0"/>
                                 <a:cs typeface="Times New Roman" pitchFamily="18" charset="0"/>
                               </a:rPr>
                             </m:ctrlPr>
@@ -9231,7 +9415,7 @@
                           <m:sSubPr>
                             <m:ctrlPr>
                               <a:rPr lang="ru-RU" i="1">
-                                <a:latin typeface="Cambria Math"/>
+                                <a:latin typeface="Cambria Math" panose="02040503050406030204" pitchFamily="18" charset="0"/>
                                 <a:cs typeface="Times New Roman" pitchFamily="18" charset="0"/>
                               </a:rPr>
                             </m:ctrlPr>
@@ -9350,6 +9534,13 @@
   <p:clrMapOvr>
     <a:masterClrMapping/>
   </p:clrMapOvr>
+  <p:timing>
+    <p:tnLst>
+      <p:par>
+        <p:cTn id="1" dur="indefinite" restart="never" nodeType="tmRoot"/>
+      </p:par>
+    </p:tnLst>
+  </p:timing>
 </p:sld>
 </file>
 
@@ -9460,7 +9651,7 @@
                       <m:fPr>
                         <m:ctrlPr>
                           <a:rPr lang="ru-RU" i="1">
-                            <a:latin typeface="Cambria Math"/>
+                            <a:latin typeface="Cambria Math" panose="02040503050406030204" pitchFamily="18" charset="0"/>
                             <a:cs typeface="Times New Roman" pitchFamily="18" charset="0"/>
                           </a:rPr>
                         </m:ctrlPr>
@@ -9470,7 +9661,7 @@
                           <m:sSubPr>
                             <m:ctrlPr>
                               <a:rPr lang="ru-RU" i="1">
-                                <a:latin typeface="Cambria Math"/>
+                                <a:latin typeface="Cambria Math" panose="02040503050406030204" pitchFamily="18" charset="0"/>
                                 <a:cs typeface="Times New Roman" pitchFamily="18" charset="0"/>
                               </a:rPr>
                             </m:ctrlPr>
@@ -9500,7 +9691,7 @@
                           <m:sSubPr>
                             <m:ctrlPr>
                               <a:rPr lang="ru-RU" i="1">
-                                <a:latin typeface="Cambria Math"/>
+                                <a:latin typeface="Cambria Math" panose="02040503050406030204" pitchFamily="18" charset="0"/>
                                 <a:cs typeface="Times New Roman" pitchFamily="18" charset="0"/>
                               </a:rPr>
                             </m:ctrlPr>
@@ -9555,7 +9746,7 @@
                       <m:fPr>
                         <m:ctrlPr>
                           <a:rPr lang="ru-RU" i="1">
-                            <a:latin typeface="Cambria Math"/>
+                            <a:latin typeface="Cambria Math" panose="02040503050406030204" pitchFamily="18" charset="0"/>
                             <a:cs typeface="Times New Roman" pitchFamily="18" charset="0"/>
                           </a:rPr>
                         </m:ctrlPr>
@@ -9565,7 +9756,7 @@
                           <m:sSubPr>
                             <m:ctrlPr>
                               <a:rPr lang="ru-RU" i="1">
-                                <a:latin typeface="Cambria Math"/>
+                                <a:latin typeface="Cambria Math" panose="02040503050406030204" pitchFamily="18" charset="0"/>
                                 <a:cs typeface="Times New Roman" pitchFamily="18" charset="0"/>
                               </a:rPr>
                             </m:ctrlPr>
@@ -9595,7 +9786,7 @@
                           <m:sSubPr>
                             <m:ctrlPr>
                               <a:rPr lang="ru-RU" i="1">
-                                <a:latin typeface="Cambria Math"/>
+                                <a:latin typeface="Cambria Math" panose="02040503050406030204" pitchFamily="18" charset="0"/>
                                 <a:cs typeface="Times New Roman" pitchFamily="18" charset="0"/>
                               </a:rPr>
                             </m:ctrlPr>
@@ -9792,6 +9983,13 @@
   <p:clrMapOvr>
     <a:masterClrMapping/>
   </p:clrMapOvr>
+  <p:timing>
+    <p:tnLst>
+      <p:par>
+        <p:cTn id="1" dur="indefinite" restart="never" nodeType="tmRoot"/>
+      </p:par>
+    </p:tnLst>
+  </p:timing>
 </p:sld>
 </file>
 

</xml_diff>